<commit_message>
Modify ppt after processor meeting
</commit_message>
<xml_diff>
--- a/doc/COWAY-mid-1.5.pptx
+++ b/doc/COWAY-mid-1.5.pptx
@@ -10949,7 +10949,7 @@
         <p:spPr>
           <a:xfrm>
             <a:off x="6301995" y="1993032"/>
-            <a:ext cx="2272143" cy="607767"/>
+            <a:ext cx="2272143" cy="678375"/>
           </a:xfrm>
           <a:prstGeom prst="roundRect">
             <a:avLst/>
@@ -11047,7 +11047,7 @@
         </p:nvSpPr>
         <p:spPr>
           <a:xfrm>
-            <a:off x="6301992" y="2838707"/>
+            <a:off x="6300498" y="3191154"/>
             <a:ext cx="2272143" cy="728378"/>
           </a:xfrm>
           <a:prstGeom prst="roundRect">
@@ -11122,8 +11122,8 @@
         </p:nvSpPr>
         <p:spPr>
           <a:xfrm>
-            <a:off x="6272268" y="3805308"/>
-            <a:ext cx="2272143" cy="727294"/>
+            <a:off x="6300500" y="4383102"/>
+            <a:ext cx="2272143" cy="656465"/>
           </a:xfrm>
           <a:prstGeom prst="roundRect">
             <a:avLst/>
@@ -11194,81 +11194,6 @@
               <a:ea typeface="맑은 고딕" panose="020B0503020000020004" pitchFamily="50" charset="-127"/>
               <a:cs typeface="+mn-cs"/>
             </a:endParaRPr>
-          </a:p>
-        </p:txBody>
-      </p:sp>
-      <p:sp>
-        <p:nvSpPr>
-          <p:cNvPr id="73" name="사각형: 둥근 모서리 20">
-            <a:extLst>
-              <a:ext uri="{FF2B5EF4-FFF2-40B4-BE49-F238E27FC236}">
-                <a16:creationId xmlns:a16="http://schemas.microsoft.com/office/drawing/2014/main" id="{1061E189-00BE-4C09-9F69-DB7CE3FC564E}"/>
-              </a:ext>
-            </a:extLst>
-          </p:cNvPr>
-          <p:cNvSpPr/>
-          <p:nvPr/>
-        </p:nvSpPr>
-        <p:spPr>
-          <a:xfrm>
-            <a:off x="6289067" y="4744196"/>
-            <a:ext cx="2272143" cy="456057"/>
-          </a:xfrm>
-          <a:prstGeom prst="roundRect">
-            <a:avLst/>
-          </a:prstGeom>
-          <a:solidFill>
-            <a:schemeClr val="tx1"/>
-          </a:solidFill>
-          <a:ln w="12700" cap="flat" cmpd="sng" algn="ctr">
-            <a:solidFill>
-              <a:sysClr val="windowText" lastClr="000000">
-                <a:lumMod val="50000"/>
-                <a:lumOff val="50000"/>
-              </a:sysClr>
-            </a:solidFill>
-            <a:prstDash val="solid"/>
-          </a:ln>
-          <a:effectLst/>
-        </p:spPr>
-        <p:txBody>
-          <a:bodyPr rtlCol="0" anchor="ctr"/>
-          <a:lstStyle/>
-          <a:p>
-            <a:pPr marL="0" marR="0" lvl="0" indent="0" defTabSz="914400" eaLnBrk="1" fontAlgn="auto" latinLnBrk="0" hangingPunct="1">
-              <a:lnSpc>
-                <a:spcPct val="100000"/>
-              </a:lnSpc>
-              <a:spcBef>
-                <a:spcPts val="0"/>
-              </a:spcBef>
-              <a:spcAft>
-                <a:spcPts val="0"/>
-              </a:spcAft>
-              <a:buClrTx/>
-              <a:buSzTx/>
-              <a:buFontTx/>
-              <a:buNone/>
-              <a:tabLst/>
-              <a:defRPr/>
-            </a:pPr>
-            <a:r>
-              <a:rPr kumimoji="0" lang="ko-KR" altLang="en-US" sz="1600" b="0" i="0" u="none" strike="noStrike" kern="0" cap="none" spc="0" normalizeH="0" baseline="0" noProof="0" dirty="0">
-                <a:ln>
-                  <a:noFill/>
-                </a:ln>
-                <a:solidFill>
-                  <a:sysClr val="windowText" lastClr="000000"/>
-                </a:solidFill>
-                <a:effectLst/>
-                <a:uLnTx/>
-                <a:uFillTx/>
-                <a:latin typeface="Calibri"/>
-                <a:ea typeface="맑은 고딕" panose="020B0503020000020004" pitchFamily="50" charset="-127"/>
-                <a:cs typeface="+mn-cs"/>
-              </a:rPr>
-              <a:t>    확장 모듈</a:t>
-            </a:r>
           </a:p>
         </p:txBody>
       </p:sp>
@@ -12607,7 +12532,7 @@
         </p:nvSpPr>
         <p:spPr>
           <a:xfrm rot="5400000">
-            <a:off x="7313411" y="2494040"/>
+            <a:off x="7311919" y="2676845"/>
             <a:ext cx="249307" cy="509004"/>
           </a:xfrm>
           <a:prstGeom prst="rightArrow">
@@ -12676,76 +12601,7 @@
         </p:nvSpPr>
         <p:spPr>
           <a:xfrm rot="5400000">
-            <a:off x="7300484" y="3456590"/>
-            <a:ext cx="249307" cy="509004"/>
-          </a:xfrm>
-          <a:prstGeom prst="rightArrow">
-            <a:avLst/>
-          </a:prstGeom>
-          <a:solidFill>
-            <a:sysClr val="window" lastClr="FFFFFF"/>
-          </a:solidFill>
-          <a:ln w="12700" cap="flat" cmpd="sng" algn="ctr">
-            <a:solidFill>
-              <a:sysClr val="windowText" lastClr="000000"/>
-            </a:solidFill>
-            <a:prstDash val="solid"/>
-          </a:ln>
-          <a:effectLst/>
-        </p:spPr>
-        <p:txBody>
-          <a:bodyPr rtlCol="0" anchor="ctr"/>
-          <a:lstStyle/>
-          <a:p>
-            <a:pPr marL="0" marR="0" lvl="0" indent="0" algn="ctr" defTabSz="914400" eaLnBrk="1" fontAlgn="auto" latinLnBrk="0" hangingPunct="1">
-              <a:lnSpc>
-                <a:spcPct val="100000"/>
-              </a:lnSpc>
-              <a:spcBef>
-                <a:spcPts val="0"/>
-              </a:spcBef>
-              <a:spcAft>
-                <a:spcPts val="0"/>
-              </a:spcAft>
-              <a:buClrTx/>
-              <a:buSzTx/>
-              <a:buFontTx/>
-              <a:buNone/>
-              <a:tabLst/>
-              <a:defRPr/>
-            </a:pPr>
-            <a:endParaRPr kumimoji="0" lang="ko-KR" altLang="en-US" sz="1800" b="0" i="0" u="none" strike="noStrike" kern="0" cap="none" spc="0" normalizeH="0" baseline="0" noProof="0">
-              <a:ln>
-                <a:noFill/>
-              </a:ln>
-              <a:solidFill>
-                <a:prstClr val="white"/>
-              </a:solidFill>
-              <a:effectLst/>
-              <a:uLnTx/>
-              <a:uFillTx/>
-              <a:latin typeface="Calibri"/>
-              <a:ea typeface="맑은 고딕" panose="020B0503020000020004" pitchFamily="50" charset="-127"/>
-              <a:cs typeface="+mn-cs"/>
-            </a:endParaRPr>
-          </a:p>
-        </p:txBody>
-      </p:sp>
-      <p:sp>
-        <p:nvSpPr>
-          <p:cNvPr id="62" name="화살표: 오른쪽 31">
-            <a:extLst>
-              <a:ext uri="{FF2B5EF4-FFF2-40B4-BE49-F238E27FC236}">
-                <a16:creationId xmlns:a16="http://schemas.microsoft.com/office/drawing/2014/main" id="{B4E3D202-F2C6-4AFA-BAC0-3891A7590CE9}"/>
-              </a:ext>
-            </a:extLst>
-          </p:cNvPr>
-          <p:cNvSpPr/>
-          <p:nvPr/>
-        </p:nvSpPr>
-        <p:spPr>
-          <a:xfrm rot="5400000">
-            <a:off x="7313727" y="4394191"/>
+            <a:off x="7311918" y="3931777"/>
             <a:ext cx="249307" cy="509004"/>
           </a:xfrm>
           <a:prstGeom prst="rightArrow">
@@ -13265,7 +13121,7 @@
         </p:nvSpPr>
         <p:spPr>
           <a:xfrm>
-            <a:off x="7719041" y="2037629"/>
+            <a:off x="7740664" y="2093382"/>
             <a:ext cx="882239" cy="492443"/>
           </a:xfrm>
           <a:prstGeom prst="rect">
@@ -13311,7 +13167,7 @@
         </p:nvSpPr>
         <p:spPr>
           <a:xfrm>
-            <a:off x="7747127" y="2954332"/>
+            <a:off x="7740665" y="3272990"/>
             <a:ext cx="882239" cy="492443"/>
           </a:xfrm>
           <a:prstGeom prst="rect">
@@ -13357,7 +13213,7 @@
         </p:nvSpPr>
         <p:spPr>
           <a:xfrm>
-            <a:off x="7740665" y="3922733"/>
+            <a:off x="7740665" y="4508351"/>
             <a:ext cx="882239" cy="492443"/>
           </a:xfrm>
           <a:prstGeom prst="rect">
@@ -13382,52 +13238,6 @@
                 <a:ea typeface="맑은 고딕" panose="020B0503020000020004" pitchFamily="50" charset="-127"/>
               </a:rPr>
               <a:t>50%</a:t>
-            </a:r>
-            <a:endParaRPr lang="ko-KR" altLang="en-US" sz="2600" b="1" dirty="0">
-              <a:solidFill>
-                <a:srgbClr val="FF0000">
-                  <a:alpha val="75000"/>
-                </a:srgbClr>
-              </a:solidFill>
-              <a:latin typeface="맑은 고딕" panose="020B0503020000020004" pitchFamily="50" charset="-127"/>
-              <a:ea typeface="맑은 고딕" panose="020B0503020000020004" pitchFamily="50" charset="-127"/>
-            </a:endParaRPr>
-          </a:p>
-        </p:txBody>
-      </p:sp>
-      <p:sp>
-        <p:nvSpPr>
-          <p:cNvPr id="39" name="TextBox 38"/>
-          <p:cNvSpPr txBox="1"/>
-          <p:nvPr/>
-        </p:nvSpPr>
-        <p:spPr>
-          <a:xfrm>
-            <a:off x="7740665" y="4735000"/>
-            <a:ext cx="882239" cy="492443"/>
-          </a:xfrm>
-          <a:prstGeom prst="rect">
-            <a:avLst/>
-          </a:prstGeom>
-          <a:noFill/>
-        </p:spPr>
-        <p:txBody>
-          <a:bodyPr wrap="square" rtlCol="0">
-            <a:spAutoFit/>
-          </a:bodyPr>
-          <a:lstStyle/>
-          <a:p>
-            <a:r>
-              <a:rPr lang="en-US" altLang="ko-KR" sz="2600" b="1" dirty="0">
-                <a:solidFill>
-                  <a:srgbClr val="FF0000">
-                    <a:alpha val="75000"/>
-                  </a:srgbClr>
-                </a:solidFill>
-                <a:latin typeface="맑은 고딕" panose="020B0503020000020004" pitchFamily="50" charset="-127"/>
-                <a:ea typeface="맑은 고딕" panose="020B0503020000020004" pitchFamily="50" charset="-127"/>
-              </a:rPr>
-              <a:t>0%</a:t>
             </a:r>
             <a:endParaRPr lang="ko-KR" altLang="en-US" sz="2600" b="1" dirty="0">
               <a:solidFill>
@@ -15610,10 +15420,6 @@
               </a:rPr>
               <a:t>k</a:t>
             </a:r>
-            <a:endParaRPr lang="en-US" altLang="ko-KR" sz="2400" b="1" dirty="0">
-              <a:latin typeface="맑은 고딕" panose="020B0503020000020004" pitchFamily="50" charset="-127"/>
-              <a:ea typeface="맑은 고딕" panose="020B0503020000020004" pitchFamily="50" charset="-127"/>
-            </a:endParaRPr>
           </a:p>
           <a:p>
             <a:endParaRPr lang="en-US" altLang="ko-KR" dirty="0"/>
@@ -18487,11 +18293,42 @@
               <a:buChar char="§"/>
             </a:pPr>
             <a:r>
+              <a:rPr lang="en-US" altLang="ko-KR" sz="1600" dirty="0" smtClean="0">
+                <a:latin typeface="나눔바른고딕" panose="020B0603020101020101" pitchFamily="50" charset="-127"/>
+                <a:ea typeface="나눔바른고딕" panose="020B0603020101020101" pitchFamily="50" charset="-127"/>
+              </a:rPr>
+              <a:t>Workflow </a:t>
+            </a:r>
+            <a:r>
+              <a:rPr lang="ko-KR" altLang="en-US" sz="1600" dirty="0" smtClean="0">
+                <a:latin typeface="나눔바른고딕" panose="020B0603020101020101" pitchFamily="50" charset="-127"/>
+                <a:ea typeface="나눔바른고딕" panose="020B0603020101020101" pitchFamily="50" charset="-127"/>
+              </a:rPr>
+              <a:t>및 진행 현황</a:t>
+            </a:r>
+            <a:endParaRPr lang="en-US" altLang="ko-KR" sz="1600" dirty="0" smtClean="0">
+              <a:latin typeface="나눔바른고딕" panose="020B0603020101020101" pitchFamily="50" charset="-127"/>
+              <a:ea typeface="나눔바른고딕" panose="020B0603020101020101" pitchFamily="50" charset="-127"/>
+            </a:endParaRPr>
+          </a:p>
+          <a:p>
+            <a:pPr lvl="1">
+              <a:buFont typeface="Wingdings" panose="05000000000000000000" pitchFamily="2" charset="2"/>
+              <a:buChar char="§"/>
+            </a:pPr>
+            <a:r>
+              <a:rPr lang="en-US" altLang="ko-KR" sz="1600" dirty="0" smtClean="0">
+                <a:latin typeface="나눔바른고딕" panose="020B0603020101020101" pitchFamily="50" charset="-127"/>
+                <a:ea typeface="나눔바른고딕" panose="020B0603020101020101" pitchFamily="50" charset="-127"/>
+              </a:rPr>
+              <a:t>Android </a:t>
+            </a:r>
+            <a:r>
               <a:rPr lang="en-US" altLang="ko-KR" sz="1600" dirty="0">
                 <a:latin typeface="나눔바른고딕" panose="020B0603020101020101" pitchFamily="50" charset="-127"/>
                 <a:ea typeface="나눔바른고딕" panose="020B0603020101020101" pitchFamily="50" charset="-127"/>
               </a:rPr>
-              <a:t>Android (FE)</a:t>
+              <a:t>(FE)</a:t>
             </a:r>
           </a:p>
           <a:p>
@@ -19024,12 +18861,28 @@
             <a:pPr marL="36900" indent="0">
               <a:buNone/>
             </a:pPr>
+            <a:endParaRPr lang="en-US" altLang="ko-KR" sz="1600" b="1" dirty="0" smtClean="0">
+              <a:latin typeface="나눔바른고딕" panose="020B0603020101020101" pitchFamily="50" charset="-127"/>
+              <a:ea typeface="나눔바른고딕" panose="020B0603020101020101" pitchFamily="50" charset="-127"/>
+            </a:endParaRPr>
+          </a:p>
+          <a:p>
+            <a:pPr marL="36900" indent="0">
+              <a:buNone/>
+            </a:pPr>
+            <a:r>
+              <a:rPr lang="en-US" altLang="ko-KR" sz="1600" b="1" dirty="0" smtClean="0">
+                <a:latin typeface="나눔바른고딕" panose="020B0603020101020101" pitchFamily="50" charset="-127"/>
+                <a:ea typeface="나눔바른고딕" panose="020B0603020101020101" pitchFamily="50" charset="-127"/>
+              </a:rPr>
+              <a:t>4</a:t>
+            </a:r>
             <a:r>
               <a:rPr lang="en-US" altLang="ko-KR" sz="1600" b="1" dirty="0">
                 <a:latin typeface="나눔바른고딕" panose="020B0603020101020101" pitchFamily="50" charset="-127"/>
                 <a:ea typeface="나눔바른고딕" panose="020B0603020101020101" pitchFamily="50" charset="-127"/>
               </a:rPr>
-              <a:t>4. </a:t>
+              <a:t>. </a:t>
             </a:r>
             <a:r>
               <a:rPr lang="en-US" altLang="ko-KR" sz="1800" b="1" dirty="0">
@@ -19252,18 +19105,18 @@
               <a:t>우변의 값을 기준으로 어떤 </a:t>
             </a:r>
             <a:r>
-              <a:rPr lang="ko-KR" altLang="en-US" b="1" dirty="0" err="1" smtClean="0">
-                <a:latin typeface="맑은 고딕" panose="020B0503020000020004" pitchFamily="50" charset="-127"/>
-                <a:ea typeface="맑은 고딕" panose="020B0503020000020004" pitchFamily="50" charset="-127"/>
-              </a:rPr>
-              <a:t>자료형</a:t>
-            </a:r>
-            <a:r>
               <a:rPr lang="ko-KR" altLang="en-US" b="1" dirty="0" smtClean="0">
                 <a:latin typeface="맑은 고딕" panose="020B0503020000020004" pitchFamily="50" charset="-127"/>
                 <a:ea typeface="맑은 고딕" panose="020B0503020000020004" pitchFamily="50" charset="-127"/>
               </a:rPr>
-              <a:t> 인지 추론</a:t>
+              <a:t>자료 형인지 </a:t>
+            </a:r>
+            <a:r>
+              <a:rPr lang="ko-KR" altLang="en-US" b="1" dirty="0" smtClean="0">
+                <a:latin typeface="맑은 고딕" panose="020B0503020000020004" pitchFamily="50" charset="-127"/>
+                <a:ea typeface="맑은 고딕" panose="020B0503020000020004" pitchFamily="50" charset="-127"/>
+              </a:rPr>
+              <a:t>추론</a:t>
             </a:r>
             <a:endParaRPr lang="en-US" altLang="ko-KR" b="1" dirty="0" smtClean="0">
               <a:latin typeface="맑은 고딕" panose="020B0503020000020004" pitchFamily="50" charset="-127"/>
@@ -19580,6 +19433,13 @@
   <p:clrMapOvr>
     <a:masterClrMapping/>
   </p:clrMapOvr>
+  <p:timing>
+    <p:tnLst>
+      <p:par>
+        <p:cTn id="1" dur="indefinite" restart="never" nodeType="tmRoot"/>
+      </p:par>
+    </p:tnLst>
+  </p:timing>
 </p:sld>
 </file>
 
@@ -20355,6 +20215,13 @@
   <p:clrMapOvr>
     <a:masterClrMapping/>
   </p:clrMapOvr>
+  <p:timing>
+    <p:tnLst>
+      <p:par>
+        <p:cTn id="1" dur="indefinite" restart="never" nodeType="tmRoot"/>
+      </p:par>
+    </p:tnLst>
+  </p:timing>
 </p:sld>
 </file>
 
@@ -21094,6 +20961,13 @@
   <p:clrMapOvr>
     <a:masterClrMapping/>
   </p:clrMapOvr>
+  <p:timing>
+    <p:tnLst>
+      <p:par>
+        <p:cTn id="1" dur="indefinite" restart="never" nodeType="tmRoot"/>
+      </p:par>
+    </p:tnLst>
+  </p:timing>
 </p:sld>
 </file>
 
@@ -21194,6 +21068,13 @@
   <p:clrMapOvr>
     <a:masterClrMapping/>
   </p:clrMapOvr>
+  <p:timing>
+    <p:tnLst>
+      <p:par>
+        <p:cTn id="1" dur="indefinite" restart="never" nodeType="tmRoot"/>
+      </p:par>
+    </p:tnLst>
+  </p:timing>
 </p:sld>
 </file>
 
@@ -21578,6 +21459,13 @@
   <p:clrMapOvr>
     <a:masterClrMapping/>
   </p:clrMapOvr>
+  <p:timing>
+    <p:tnLst>
+      <p:par>
+        <p:cTn id="1" dur="indefinite" restart="never" nodeType="tmRoot"/>
+      </p:par>
+    </p:tnLst>
+  </p:timing>
 </p:sld>
 </file>
 
@@ -22546,6 +22434,13 @@
   <p:clrMapOvr>
     <a:masterClrMapping/>
   </p:clrMapOvr>
+  <p:timing>
+    <p:tnLst>
+      <p:par>
+        <p:cTn id="1" dur="indefinite" restart="never" nodeType="tmRoot"/>
+      </p:par>
+    </p:tnLst>
+  </p:timing>
 </p:sld>
 </file>
 
@@ -23174,6 +23069,13 @@
   <p:clrMapOvr>
     <a:masterClrMapping/>
   </p:clrMapOvr>
+  <p:timing>
+    <p:tnLst>
+      <p:par>
+        <p:cTn id="1" dur="indefinite" restart="never" nodeType="tmRoot"/>
+      </p:par>
+    </p:tnLst>
+  </p:timing>
 </p:sld>
 </file>
 
@@ -24002,6 +23904,13 @@
   <p:clrMapOvr>
     <a:masterClrMapping/>
   </p:clrMapOvr>
+  <p:timing>
+    <p:tnLst>
+      <p:par>
+        <p:cTn id="1" dur="indefinite" restart="never" nodeType="tmRoot"/>
+      </p:par>
+    </p:tnLst>
+  </p:timing>
 </p:sld>
 </file>
 
@@ -24861,6 +24770,13 @@
   <p:clrMapOvr>
     <a:masterClrMapping/>
   </p:clrMapOvr>
+  <p:timing>
+    <p:tnLst>
+      <p:par>
+        <p:cTn id="1" dur="indefinite" restart="never" nodeType="tmRoot"/>
+      </p:par>
+    </p:tnLst>
+  </p:timing>
 </p:sld>
 </file>
 
@@ -24945,6 +24861,13 @@
   <p:clrMapOvr>
     <a:masterClrMapping/>
   </p:clrMapOvr>
+  <p:timing>
+    <p:tnLst>
+      <p:par>
+        <p:cTn id="1" dur="indefinite" restart="never" nodeType="tmRoot"/>
+      </p:par>
+    </p:tnLst>
+  </p:timing>
 </p:sld>
 </file>
 
@@ -25077,6 +25000,13 @@
   <p:clrMapOvr>
     <a:masterClrMapping/>
   </p:clrMapOvr>
+  <p:timing>
+    <p:tnLst>
+      <p:par>
+        <p:cTn id="1" dur="indefinite" restart="never" nodeType="tmRoot"/>
+      </p:par>
+    </p:tnLst>
+  </p:timing>
 </p:sld>
 </file>
 
@@ -25783,7 +25713,7 @@
             <a:p>
               <a:pPr algn="ctr" latinLnBrk="1"/>
               <a:r>
-                <a:rPr lang="en-US" altLang="ko-KR" b="1">
+                <a:rPr lang="en-US" altLang="ko-KR" b="1" dirty="0">
                   <a:solidFill>
                     <a:prstClr val="white"/>
                   </a:solidFill>
@@ -25793,7 +25723,7 @@
                 <a:t>	</a:t>
               </a:r>
               <a:r>
-                <a:rPr lang="ko-KR" altLang="ko-KR" b="1">
+                <a:rPr lang="ko-KR" altLang="ko-KR" b="1" dirty="0">
                   <a:solidFill>
                     <a:prstClr val="white"/>
                   </a:solidFill>
@@ -25803,7 +25733,7 @@
                 <a:t>손으로 작성된 </a:t>
               </a:r>
               <a:r>
-                <a:rPr lang="ko-KR" altLang="en-US" b="1">
+                <a:rPr lang="ko-KR" altLang="en-US" b="1" dirty="0">
                   <a:solidFill>
                     <a:prstClr val="white"/>
                   </a:solidFill>
@@ -25813,7 +25743,7 @@
                 <a:t>간단한 </a:t>
               </a:r>
               <a:r>
-                <a:rPr lang="ko-KR" altLang="ko-KR" b="1">
+                <a:rPr lang="ko-KR" altLang="ko-KR" b="1" dirty="0">
                   <a:solidFill>
                     <a:prstClr val="white"/>
                   </a:solidFill>
@@ -25823,7 +25753,7 @@
                 <a:t>수도 코드를 사진으로 찍어 </a:t>
               </a:r>
               <a:r>
-                <a:rPr lang="ko-KR" altLang="en-US" b="1">
+                <a:rPr lang="ko-KR" altLang="en-US" b="1" dirty="0">
                   <a:solidFill>
                     <a:prstClr val="white"/>
                   </a:solidFill>
@@ -25832,7 +25762,7 @@
                 </a:rPr>
                 <a:t>서버로 전송 후 </a:t>
               </a:r>
-              <a:endParaRPr lang="en-US" altLang="ko-KR" b="1">
+              <a:endParaRPr lang="en-US" altLang="ko-KR" b="1" dirty="0">
                 <a:solidFill>
                   <a:prstClr val="white"/>
                 </a:solidFill>
@@ -25843,47 +25773,87 @@
             <a:p>
               <a:pPr algn="ctr" latinLnBrk="1"/>
               <a:r>
-                <a:rPr lang="ko-KR" altLang="en-US" b="1">
+                <a:rPr lang="ko-KR" altLang="en-US" b="1" dirty="0">
                   <a:solidFill>
                     <a:prstClr val="white"/>
                   </a:solidFill>
                   <a:latin typeface="나눔고딕" panose="020D0604000000000000" pitchFamily="50" charset="-127"/>
                   <a:ea typeface="나눔고딕" panose="020D0604000000000000" pitchFamily="50" charset="-127"/>
                 </a:rPr>
-                <a:t>    문법이 적용되어  컴파일이 가능한 </a:t>
+                <a:t>    </a:t>
               </a:r>
               <a:r>
-                <a:rPr lang="ko-KR" altLang="ko-KR" b="1">
+                <a:rPr lang="en-US" altLang="ko-KR" b="1" dirty="0" smtClean="0">
                   <a:solidFill>
                     <a:prstClr val="white"/>
                   </a:solidFill>
                   <a:latin typeface="나눔고딕" panose="020D0604000000000000" pitchFamily="50" charset="-127"/>
                   <a:ea typeface="나눔고딕" panose="020D0604000000000000" pitchFamily="50" charset="-127"/>
                 </a:rPr>
-                <a:t>텍스트 형태의 </a:t>
+                <a:t>java </a:t>
               </a:r>
               <a:r>
-                <a:rPr lang="en-US" altLang="ko-KR" b="1">
+                <a:rPr lang="ko-KR" altLang="en-US" b="1" dirty="0" smtClean="0">
                   <a:solidFill>
                     <a:prstClr val="white"/>
                   </a:solidFill>
                   <a:latin typeface="나눔고딕" panose="020D0604000000000000" pitchFamily="50" charset="-127"/>
                   <a:ea typeface="나눔고딕" panose="020D0604000000000000" pitchFamily="50" charset="-127"/>
                 </a:rPr>
-                <a:t>Java</a:t>
+                <a:t>문법이 적용된 </a:t>
               </a:r>
               <a:r>
-                <a:rPr lang="ko-KR" altLang="ko-KR" b="1">
+                <a:rPr lang="en-US" altLang="ko-KR" b="1" dirty="0" smtClean="0">
                   <a:solidFill>
                     <a:prstClr val="white"/>
                   </a:solidFill>
                   <a:latin typeface="나눔고딕" panose="020D0604000000000000" pitchFamily="50" charset="-127"/>
                   <a:ea typeface="나눔고딕" panose="020D0604000000000000" pitchFamily="50" charset="-127"/>
                 </a:rPr>
-                <a:t> 변환 </a:t>
+                <a:t>text</a:t>
               </a:r>
               <a:r>
-                <a:rPr lang="ko-KR" altLang="en-US" b="1">
+                <a:rPr lang="ko-KR" altLang="en-US" b="1" dirty="0" smtClean="0">
+                  <a:solidFill>
+                    <a:prstClr val="white"/>
+                  </a:solidFill>
+                  <a:latin typeface="나눔고딕" panose="020D0604000000000000" pitchFamily="50" charset="-127"/>
+                  <a:ea typeface="나눔고딕" panose="020D0604000000000000" pitchFamily="50" charset="-127"/>
+                </a:rPr>
+                <a:t>로</a:t>
+              </a:r>
+              <a:r>
+                <a:rPr lang="ko-KR" altLang="ko-KR" b="1" dirty="0" smtClean="0">
+                  <a:solidFill>
+                    <a:prstClr val="white"/>
+                  </a:solidFill>
+                  <a:latin typeface="나눔고딕" panose="020D0604000000000000" pitchFamily="50" charset="-127"/>
+                  <a:ea typeface="나눔고딕" panose="020D0604000000000000" pitchFamily="50" charset="-127"/>
+                </a:rPr>
+                <a:t> 변환</a:t>
+              </a:r>
+              <a:r>
+                <a:rPr lang="ko-KR" altLang="en-US" b="1" dirty="0" smtClean="0">
+                  <a:solidFill>
+                    <a:prstClr val="white"/>
+                  </a:solidFill>
+                  <a:latin typeface="나눔고딕" panose="020D0604000000000000" pitchFamily="50" charset="-127"/>
+                  <a:ea typeface="나눔고딕" panose="020D0604000000000000" pitchFamily="50" charset="-127"/>
+                </a:rPr>
+                <a:t>해주는</a:t>
+              </a:r>
+              <a:r>
+                <a:rPr lang="ko-KR" altLang="ko-KR" b="1" dirty="0" smtClean="0">
+                  <a:solidFill>
+                    <a:prstClr val="white"/>
+                  </a:solidFill>
+                  <a:latin typeface="나눔고딕" panose="020D0604000000000000" pitchFamily="50" charset="-127"/>
+                  <a:ea typeface="나눔고딕" panose="020D0604000000000000" pitchFamily="50" charset="-127"/>
+                </a:rPr>
+                <a:t> </a:t>
+              </a:r>
+              <a:r>
+                <a:rPr lang="ko-KR" altLang="en-US" b="1" dirty="0">
                   <a:solidFill>
                     <a:prstClr val="white"/>
                   </a:solidFill>
@@ -25893,7 +25863,7 @@
                 <a:t>어플리케이션</a:t>
               </a:r>
               <a:r>
-                <a:rPr lang="ko-KR" altLang="ko-KR" b="1">
+                <a:rPr lang="ko-KR" altLang="ko-KR" b="1" dirty="0">
                   <a:solidFill>
                     <a:prstClr val="white"/>
                   </a:solidFill>
@@ -25902,7 +25872,7 @@
                 </a:rPr>
                 <a:t> 개발</a:t>
               </a:r>
-              <a:endParaRPr lang="en-US" altLang="ko-KR" b="1">
+              <a:endParaRPr lang="en-US" altLang="ko-KR" b="1" dirty="0">
                 <a:solidFill>
                   <a:prstClr val="white"/>
                 </a:solidFill>

</xml_diff>